<commit_message>
Update AV1 - DESENVOLVIMENTO DE 5 CASES TÉCNICOS.pptx
</commit_message>
<xml_diff>
--- a/AV1 - DESENVOLVIMENTO DE 5 CASES TÉCNICOS.pptx
+++ b/AV1 - DESENVOLVIMENTO DE 5 CASES TÉCNICOS.pptx
@@ -109,7 +109,57 @@
       </a:defRPr>
     </a:lvl9pPr>
   </p:defaultTextStyle>
+  <p:extLst>
+    <p:ext uri="{EFAFB233-063F-42B5-8137-9DF3F51BA10A}">
+      <p15:sldGuideLst xmlns:p15="http://schemas.microsoft.com/office/powerpoint/2012/main"/>
+    </p:ext>
+  </p:extLst>
 </p:presentation>
+</file>
+
+<file path=ppt/revisionInfo.xml><?xml version="1.0" encoding="utf-8"?>
+<p1510:revInfo xmlns:a="http://schemas.openxmlformats.org/drawingml/2006/main" xmlns:r="http://schemas.openxmlformats.org/officeDocument/2006/relationships" xmlns:p1510="http://schemas.microsoft.com/office/powerpoint/2015/10/main">
+  <p1510:revLst>
+    <p1510:client id="{A3122C09-BE52-49E8-9AA1-93C7C3053773}" v="2" dt="2023-02-15T02:46:57.585"/>
+  </p1510:revLst>
+</p1510:revInfo>
+</file>
+
+<file path=ppt/changesInfos/changesInfo1.xml><?xml version="1.0" encoding="utf-8"?>
+<pc:chgInfo xmlns:a="http://schemas.openxmlformats.org/drawingml/2006/main" xmlns:r="http://schemas.openxmlformats.org/officeDocument/2006/relationships" xmlns:ac="http://schemas.microsoft.com/office/drawing/2013/main/command" xmlns:pc="http://schemas.microsoft.com/office/powerpoint/2013/main/command">
+  <pc:docChgLst>
+    <pc:chgData name="Esdras Santos" userId="de69ac21027d344b" providerId="LiveId" clId="{A3122C09-BE52-49E8-9AA1-93C7C3053773}"/>
+    <pc:docChg chg="modSld">
+      <pc:chgData name="Esdras Santos" userId="de69ac21027d344b" providerId="LiveId" clId="{A3122C09-BE52-49E8-9AA1-93C7C3053773}" dt="2023-02-15T02:47:27.753" v="102" actId="1076"/>
+      <pc:docMkLst>
+        <pc:docMk/>
+      </pc:docMkLst>
+      <pc:sldChg chg="addSp modSp mod">
+        <pc:chgData name="Esdras Santos" userId="de69ac21027d344b" providerId="LiveId" clId="{A3122C09-BE52-49E8-9AA1-93C7C3053773}" dt="2023-02-15T02:47:27.753" v="102" actId="1076"/>
+        <pc:sldMkLst>
+          <pc:docMk/>
+          <pc:sldMk cId="2805023364" sldId="262"/>
+        </pc:sldMkLst>
+        <pc:spChg chg="mod">
+          <ac:chgData name="Esdras Santos" userId="de69ac21027d344b" providerId="LiveId" clId="{A3122C09-BE52-49E8-9AA1-93C7C3053773}" dt="2023-02-15T02:47:25.420" v="101" actId="1076"/>
+          <ac:spMkLst>
+            <pc:docMk/>
+            <pc:sldMk cId="2805023364" sldId="262"/>
+            <ac:spMk id="2" creationId="{92C4FB52-EF18-2113-D08C-3122CC40C7CC}"/>
+          </ac:spMkLst>
+        </pc:spChg>
+        <pc:spChg chg="add mod">
+          <ac:chgData name="Esdras Santos" userId="de69ac21027d344b" providerId="LiveId" clId="{A3122C09-BE52-49E8-9AA1-93C7C3053773}" dt="2023-02-15T02:47:27.753" v="102" actId="1076"/>
+          <ac:spMkLst>
+            <pc:docMk/>
+            <pc:sldMk cId="2805023364" sldId="262"/>
+            <ac:spMk id="3" creationId="{80FDB9EE-F677-4989-C4A6-2B186AF58A58}"/>
+          </ac:spMkLst>
+        </pc:spChg>
+      </pc:sldChg>
+    </pc:docChg>
+  </pc:docChgLst>
+</pc:chgInfo>
 </file>
 
 <file path=ppt/slideLayouts/slideLayout1.xml><?xml version="1.0" encoding="utf-8"?>
@@ -3344,7 +3394,7 @@
         </p:nvSpPr>
         <p:spPr>
           <a:xfrm>
-            <a:off x="838200" y="1597577"/>
+            <a:off x="838200" y="1349284"/>
             <a:ext cx="10515600" cy="1325563"/>
           </a:xfrm>
         </p:spPr>
@@ -3418,6 +3468,56 @@
               </a:rPr>
               <a:t>Superior de Tecnologia em Ciência de Dados</a:t>
             </a:r>
+          </a:p>
+        </p:txBody>
+      </p:sp>
+      <p:sp>
+        <p:nvSpPr>
+          <p:cNvPr id="3" name="CaixaDeTexto 2">
+            <a:extLst>
+              <a:ext uri="{FF2B5EF4-FFF2-40B4-BE49-F238E27FC236}">
+                <a16:creationId xmlns:a16="http://schemas.microsoft.com/office/drawing/2014/main" id="{80FDB9EE-F677-4989-C4A6-2B186AF58A58}"/>
+              </a:ext>
+            </a:extLst>
+          </p:cNvPr>
+          <p:cNvSpPr txBox="1"/>
+          <p:nvPr/>
+        </p:nvSpPr>
+        <p:spPr>
+          <a:xfrm>
+            <a:off x="2513128" y="5508716"/>
+            <a:ext cx="7165744" cy="276999"/>
+          </a:xfrm>
+          <a:prstGeom prst="rect">
+            <a:avLst/>
+          </a:prstGeom>
+          <a:noFill/>
+        </p:spPr>
+        <p:txBody>
+          <a:bodyPr wrap="none" rtlCol="0">
+            <a:spAutoFit/>
+          </a:bodyPr>
+          <a:lstStyle/>
+          <a:p>
+            <a:r>
+              <a:rPr lang="pt-BR" sz="1200" dirty="0">
+                <a:latin typeface="Arial" panose="020B0604020202020204" pitchFamily="34" charset="0"/>
+                <a:cs typeface="Arial" panose="020B0604020202020204" pitchFamily="34" charset="0"/>
+              </a:rPr>
+              <a:t>Repositório: </a:t>
+            </a:r>
+            <a:r>
+              <a:rPr lang="pt-BR" sz="1200" dirty="0">
+                <a:latin typeface="Arial" panose="020B0604020202020204" pitchFamily="34" charset="0"/>
+                <a:cs typeface="Arial" panose="020B0604020202020204" pitchFamily="34" charset="0"/>
+                <a:hlinkClick r:id="rId2"/>
+              </a:rPr>
+              <a:t>https://github.com/tecninja/AtividadeFaculdade-ProgramacaoEstruturaMineracaoDeDados</a:t>
+            </a:r>
+            <a:endParaRPr lang="pt-BR" sz="1200" dirty="0">
+              <a:latin typeface="Arial" panose="020B0604020202020204" pitchFamily="34" charset="0"/>
+              <a:cs typeface="Arial" panose="020B0604020202020204" pitchFamily="34" charset="0"/>
+            </a:endParaRPr>
           </a:p>
         </p:txBody>
       </p:sp>

</xml_diff>